<commit_message>
updated fig 1 and added Dallas components
</commit_message>
<xml_diff>
--- a/assembly/pictures/pdf/Spiraltilefactory.pptx
+++ b/assembly/pictures/pdf/Spiraltilefactory.pptx
@@ -7,7 +7,7 @@
   <p:sldIdLst>
     <p:sldId id="256" r:id="rId2"/>
   </p:sldIdLst>
-  <p:sldSz cx="8504238" cy="2193925"/>
+  <p:sldSz cx="8504238" cy="2103438"/>
   <p:notesSz cx="6858000" cy="9144000"/>
   <p:defaultTextStyle>
     <a:defPPr>
@@ -136,8 +136,8 @@
         </p:nvSpPr>
         <p:spPr>
           <a:xfrm>
-            <a:off x="637818" y="681539"/>
-            <a:ext cx="7228602" cy="470272"/>
+            <a:off x="637818" y="653430"/>
+            <a:ext cx="7228602" cy="450876"/>
           </a:xfrm>
         </p:spPr>
         <p:txBody>
@@ -164,8 +164,8 @@
         </p:nvSpPr>
         <p:spPr>
           <a:xfrm>
-            <a:off x="1275636" y="1243224"/>
-            <a:ext cx="5952967" cy="560670"/>
+            <a:off x="1275638" y="1191948"/>
+            <a:ext cx="5952967" cy="537546"/>
           </a:xfrm>
         </p:spPr>
         <p:txBody>
@@ -288,7 +288,7 @@
           <a:p>
             <a:fld id="{BD062408-EA1B-994F-9E64-636DB23DCB45}" type="datetimeFigureOut">
               <a:rPr lang="en-US" smtClean="0"/>
-              <a:t>2/15/17</a:t>
+              <a:t>5/3/17</a:t>
             </a:fld>
             <a:endParaRPr lang="en-US"/>
           </a:p>
@@ -458,7 +458,7 @@
           <a:p>
             <a:fld id="{BD062408-EA1B-994F-9E64-636DB23DCB45}" type="datetimeFigureOut">
               <a:rPr lang="en-US" smtClean="0"/>
-              <a:t>2/15/17</a:t>
+              <a:t>5/3/17</a:t>
             </a:fld>
             <a:endParaRPr lang="en-US"/>
           </a:p>
@@ -548,8 +548,8 @@
         </p:nvSpPr>
         <p:spPr>
           <a:xfrm>
-            <a:off x="6165574" y="35046"/>
-            <a:ext cx="1913453" cy="749083"/>
+            <a:off x="6165576" y="33602"/>
+            <a:ext cx="1913453" cy="718187"/>
           </a:xfrm>
         </p:spPr>
         <p:txBody>
@@ -576,8 +576,8 @@
         </p:nvSpPr>
         <p:spPr>
           <a:xfrm>
-            <a:off x="425212" y="35046"/>
-            <a:ext cx="5598623" cy="749083"/>
+            <a:off x="425214" y="33602"/>
+            <a:ext cx="5598623" cy="718187"/>
           </a:xfrm>
         </p:spPr>
         <p:txBody>
@@ -638,7 +638,7 @@
           <a:p>
             <a:fld id="{BD062408-EA1B-994F-9E64-636DB23DCB45}" type="datetimeFigureOut">
               <a:rPr lang="en-US" smtClean="0"/>
-              <a:t>2/15/17</a:t>
+              <a:t>5/3/17</a:t>
             </a:fld>
             <a:endParaRPr lang="en-US"/>
           </a:p>
@@ -808,7 +808,7 @@
           <a:p>
             <a:fld id="{BD062408-EA1B-994F-9E64-636DB23DCB45}" type="datetimeFigureOut">
               <a:rPr lang="en-US" smtClean="0"/>
-              <a:t>2/15/17</a:t>
+              <a:t>5/3/17</a:t>
             </a:fld>
             <a:endParaRPr lang="en-US"/>
           </a:p>
@@ -898,8 +898,8 @@
         </p:nvSpPr>
         <p:spPr>
           <a:xfrm>
-            <a:off x="671776" y="1409801"/>
-            <a:ext cx="7228602" cy="435738"/>
+            <a:off x="671776" y="1351655"/>
+            <a:ext cx="7228602" cy="417767"/>
           </a:xfrm>
         </p:spPr>
         <p:txBody>
@@ -930,8 +930,8 @@
         </p:nvSpPr>
         <p:spPr>
           <a:xfrm>
-            <a:off x="671776" y="929879"/>
-            <a:ext cx="7228602" cy="479922"/>
+            <a:off x="671776" y="891527"/>
+            <a:ext cx="7228602" cy="460128"/>
           </a:xfrm>
         </p:spPr>
         <p:txBody>
@@ -1054,7 +1054,7 @@
           <a:p>
             <a:fld id="{BD062408-EA1B-994F-9E64-636DB23DCB45}" type="datetimeFigureOut">
               <a:rPr lang="en-US" smtClean="0"/>
-              <a:t>2/15/17</a:t>
+              <a:t>5/3/17</a:t>
             </a:fld>
             <a:endParaRPr lang="en-US"/>
           </a:p>
@@ -1167,8 +1167,8 @@
         </p:nvSpPr>
         <p:spPr>
           <a:xfrm>
-            <a:off x="425212" y="204666"/>
-            <a:ext cx="3756039" cy="579460"/>
+            <a:off x="425214" y="196224"/>
+            <a:ext cx="3756039" cy="555561"/>
           </a:xfrm>
         </p:spPr>
         <p:txBody>
@@ -1252,8 +1252,8 @@
         </p:nvSpPr>
         <p:spPr>
           <a:xfrm>
-            <a:off x="4322987" y="204666"/>
-            <a:ext cx="3756039" cy="579460"/>
+            <a:off x="4322989" y="196224"/>
+            <a:ext cx="3756039" cy="555561"/>
           </a:xfrm>
         </p:spPr>
         <p:txBody>
@@ -1342,7 +1342,7 @@
           <a:p>
             <a:fld id="{BD062408-EA1B-994F-9E64-636DB23DCB45}" type="datetimeFigureOut">
               <a:rPr lang="en-US" smtClean="0"/>
-              <a:t>2/15/17</a:t>
+              <a:t>5/3/17</a:t>
             </a:fld>
             <a:endParaRPr lang="en-US"/>
           </a:p>
@@ -1432,8 +1432,8 @@
         </p:nvSpPr>
         <p:spPr>
           <a:xfrm>
-            <a:off x="425212" y="87859"/>
-            <a:ext cx="7653815" cy="365654"/>
+            <a:off x="425214" y="84235"/>
+            <a:ext cx="7653815" cy="350573"/>
           </a:xfrm>
         </p:spPr>
         <p:txBody>
@@ -1464,8 +1464,8 @@
         </p:nvSpPr>
         <p:spPr>
           <a:xfrm>
-            <a:off x="425213" y="491097"/>
-            <a:ext cx="3757516" cy="204665"/>
+            <a:off x="425213" y="470843"/>
+            <a:ext cx="3757516" cy="196223"/>
           </a:xfrm>
         </p:spPr>
         <p:txBody>
@@ -1529,8 +1529,8 @@
         </p:nvSpPr>
         <p:spPr>
           <a:xfrm>
-            <a:off x="425213" y="695759"/>
-            <a:ext cx="3757516" cy="1264046"/>
+            <a:off x="425213" y="667063"/>
+            <a:ext cx="3757516" cy="1211911"/>
           </a:xfrm>
         </p:spPr>
         <p:txBody>
@@ -1614,8 +1614,8 @@
         </p:nvSpPr>
         <p:spPr>
           <a:xfrm>
-            <a:off x="4320038" y="491097"/>
-            <a:ext cx="3758991" cy="204665"/>
+            <a:off x="4320040" y="470843"/>
+            <a:ext cx="3758991" cy="196223"/>
           </a:xfrm>
         </p:spPr>
         <p:txBody>
@@ -1679,8 +1679,8 @@
         </p:nvSpPr>
         <p:spPr>
           <a:xfrm>
-            <a:off x="4320038" y="695759"/>
-            <a:ext cx="3758991" cy="1264046"/>
+            <a:off x="4320040" y="667063"/>
+            <a:ext cx="3758991" cy="1211911"/>
           </a:xfrm>
         </p:spPr>
         <p:txBody>
@@ -1769,7 +1769,7 @@
           <a:p>
             <a:fld id="{BD062408-EA1B-994F-9E64-636DB23DCB45}" type="datetimeFigureOut">
               <a:rPr lang="en-US" smtClean="0"/>
-              <a:t>2/15/17</a:t>
+              <a:t>5/3/17</a:t>
             </a:fld>
             <a:endParaRPr lang="en-US"/>
           </a:p>
@@ -1887,7 +1887,7 @@
           <a:p>
             <a:fld id="{BD062408-EA1B-994F-9E64-636DB23DCB45}" type="datetimeFigureOut">
               <a:rPr lang="en-US" smtClean="0"/>
-              <a:t>2/15/17</a:t>
+              <a:t>5/3/17</a:t>
             </a:fld>
             <a:endParaRPr lang="en-US"/>
           </a:p>
@@ -1982,7 +1982,7 @@
           <a:p>
             <a:fld id="{BD062408-EA1B-994F-9E64-636DB23DCB45}" type="datetimeFigureOut">
               <a:rPr lang="en-US" smtClean="0"/>
-              <a:t>2/15/17</a:t>
+              <a:t>5/3/17</a:t>
             </a:fld>
             <a:endParaRPr lang="en-US"/>
           </a:p>
@@ -2072,8 +2072,8 @@
         </p:nvSpPr>
         <p:spPr>
           <a:xfrm>
-            <a:off x="425217" y="87351"/>
-            <a:ext cx="2797835" cy="371748"/>
+            <a:off x="425219" y="83748"/>
+            <a:ext cx="2797835" cy="356415"/>
           </a:xfrm>
         </p:spPr>
         <p:txBody>
@@ -2104,8 +2104,8 @@
         </p:nvSpPr>
         <p:spPr>
           <a:xfrm>
-            <a:off x="3324921" y="87354"/>
-            <a:ext cx="4754106" cy="1872455"/>
+            <a:off x="3324921" y="83752"/>
+            <a:ext cx="4754106" cy="1795227"/>
           </a:xfrm>
         </p:spPr>
         <p:txBody>
@@ -2189,8 +2189,8 @@
         </p:nvSpPr>
         <p:spPr>
           <a:xfrm>
-            <a:off x="425217" y="459100"/>
-            <a:ext cx="2797835" cy="1500706"/>
+            <a:off x="425219" y="440165"/>
+            <a:ext cx="2797835" cy="1438810"/>
           </a:xfrm>
         </p:spPr>
         <p:txBody>
@@ -2259,7 +2259,7 @@
           <a:p>
             <a:fld id="{BD062408-EA1B-994F-9E64-636DB23DCB45}" type="datetimeFigureOut">
               <a:rPr lang="en-US" smtClean="0"/>
-              <a:t>2/15/17</a:t>
+              <a:t>5/3/17</a:t>
             </a:fld>
             <a:endParaRPr lang="en-US"/>
           </a:p>
@@ -2349,8 +2349,8 @@
         </p:nvSpPr>
         <p:spPr>
           <a:xfrm>
-            <a:off x="1666891" y="1535748"/>
-            <a:ext cx="5102543" cy="181304"/>
+            <a:off x="1666893" y="1472407"/>
+            <a:ext cx="5102543" cy="173827"/>
           </a:xfrm>
         </p:spPr>
         <p:txBody>
@@ -2381,8 +2381,8 @@
         </p:nvSpPr>
         <p:spPr>
           <a:xfrm>
-            <a:off x="1666891" y="196034"/>
-            <a:ext cx="5102543" cy="1316355"/>
+            <a:off x="1666893" y="187950"/>
+            <a:ext cx="5102543" cy="1262063"/>
           </a:xfrm>
         </p:spPr>
         <p:txBody>
@@ -2442,8 +2442,8 @@
         </p:nvSpPr>
         <p:spPr>
           <a:xfrm>
-            <a:off x="1666891" y="1717051"/>
-            <a:ext cx="5102543" cy="257482"/>
+            <a:off x="1666893" y="1646233"/>
+            <a:ext cx="5102543" cy="246862"/>
           </a:xfrm>
         </p:spPr>
         <p:txBody>
@@ -2512,7 +2512,7 @@
           <a:p>
             <a:fld id="{BD062408-EA1B-994F-9E64-636DB23DCB45}" type="datetimeFigureOut">
               <a:rPr lang="en-US" smtClean="0"/>
-              <a:t>2/15/17</a:t>
+              <a:t>5/3/17</a:t>
             </a:fld>
             <a:endParaRPr lang="en-US"/>
           </a:p>
@@ -2607,8 +2607,8 @@
         </p:nvSpPr>
         <p:spPr>
           <a:xfrm>
-            <a:off x="425212" y="87859"/>
-            <a:ext cx="7653815" cy="365654"/>
+            <a:off x="425214" y="84235"/>
+            <a:ext cx="7653815" cy="350573"/>
           </a:xfrm>
           <a:prstGeom prst="rect">
             <a:avLst/>
@@ -2640,8 +2640,8 @@
         </p:nvSpPr>
         <p:spPr>
           <a:xfrm>
-            <a:off x="425212" y="511920"/>
-            <a:ext cx="7653815" cy="1447889"/>
+            <a:off x="425214" y="490807"/>
+            <a:ext cx="7653815" cy="1388172"/>
           </a:xfrm>
           <a:prstGeom prst="rect">
             <a:avLst/>
@@ -2702,8 +2702,8 @@
         </p:nvSpPr>
         <p:spPr>
           <a:xfrm>
-            <a:off x="425212" y="2033444"/>
-            <a:ext cx="1984322" cy="116806"/>
+            <a:off x="425212" y="1949577"/>
+            <a:ext cx="1984322" cy="111988"/>
           </a:xfrm>
           <a:prstGeom prst="rect">
             <a:avLst/>
@@ -2725,7 +2725,7 @@
           <a:p>
             <a:fld id="{BD062408-EA1B-994F-9E64-636DB23DCB45}" type="datetimeFigureOut">
               <a:rPr lang="en-US" smtClean="0"/>
-              <a:t>2/15/17</a:t>
+              <a:t>5/3/17</a:t>
             </a:fld>
             <a:endParaRPr lang="en-US"/>
           </a:p>
@@ -2743,8 +2743,8 @@
         </p:nvSpPr>
         <p:spPr>
           <a:xfrm>
-            <a:off x="2905615" y="2033444"/>
-            <a:ext cx="2693009" cy="116806"/>
+            <a:off x="2905617" y="1949577"/>
+            <a:ext cx="2693009" cy="111988"/>
           </a:xfrm>
           <a:prstGeom prst="rect">
             <a:avLst/>
@@ -2780,8 +2780,8 @@
         </p:nvSpPr>
         <p:spPr>
           <a:xfrm>
-            <a:off x="6094704" y="2033444"/>
-            <a:ext cx="1984322" cy="116806"/>
+            <a:off x="6094704" y="1949577"/>
+            <a:ext cx="1984322" cy="111988"/>
           </a:xfrm>
           <a:prstGeom prst="rect">
             <a:avLst/>
@@ -3102,7 +3102,7 @@
       </p:grpSpPr>
       <p:pic>
         <p:nvPicPr>
-          <p:cNvPr id="16" name="Picture 15" descr="Spiral.pdf"/>
+          <p:cNvPr id="10" name="Picture 9" descr="spiralFactoryBlank.pdf"/>
           <p:cNvPicPr>
             <a:picLocks noChangeAspect="1"/>
           </p:cNvPicPr>
@@ -3116,13 +3116,13 @@
               </a:ext>
             </a:extLst>
           </a:blip>
-          <a:srcRect l="15482" t="42209" r="13601" b="43898"/>
+          <a:srcRect l="14982" t="41890" r="12102" b="43125"/>
           <a:stretch/>
         </p:blipFill>
         <p:spPr>
           <a:xfrm>
-            <a:off x="-50796" y="0"/>
-            <a:ext cx="8568267" cy="2172243"/>
+            <a:off x="-93946" y="-86493"/>
+            <a:ext cx="8713625" cy="2317463"/>
           </a:xfrm>
           <a:prstGeom prst="rect">
             <a:avLst/>
@@ -3131,14 +3131,14 @@
       </p:pic>
       <p:sp>
         <p:nvSpPr>
-          <p:cNvPr id="17" name="Rectangle 16"/>
+          <p:cNvPr id="11" name="Rectangle 10"/>
           <p:cNvSpPr/>
           <p:nvPr/>
         </p:nvSpPr>
         <p:spPr>
           <a:xfrm>
-            <a:off x="50804" y="702733"/>
-            <a:ext cx="1439333" cy="1422402"/>
+            <a:off x="4" y="613832"/>
+            <a:ext cx="1536696" cy="1489605"/>
           </a:xfrm>
           <a:prstGeom prst="rect">
             <a:avLst/>
@@ -3146,6 +3146,10 @@
           <a:solidFill>
             <a:schemeClr val="bg1"/>
           </a:solidFill>
+          <a:ln>
+            <a:noFill/>
+          </a:ln>
+          <a:effectLst/>
         </p:spPr>
         <p:style>
           <a:lnRef idx="1">
@@ -3172,7 +3176,7 @@
       </p:sp>
       <p:pic>
         <p:nvPicPr>
-          <p:cNvPr id="18" name="Picture 17" descr="SpiralPart.pdf"/>
+          <p:cNvPr id="12" name="Picture 11" descr="spiralTile.pdf"/>
           <p:cNvPicPr>
             <a:picLocks noChangeAspect="1"/>
           </p:cNvPicPr>
@@ -3186,13 +3190,13 @@
               </a:ext>
             </a:extLst>
           </a:blip>
-          <a:srcRect l="37138" t="40148" r="37396" b="39026"/>
+          <a:srcRect l="14100" t="22137" r="14954" b="22350"/>
           <a:stretch/>
         </p:blipFill>
         <p:spPr>
           <a:xfrm>
-            <a:off x="118537" y="753532"/>
-            <a:ext cx="1316567" cy="1393310"/>
+            <a:off x="15441" y="594588"/>
+            <a:ext cx="1480333" cy="1498994"/>
           </a:xfrm>
           <a:prstGeom prst="rect">
             <a:avLst/>

</xml_diff>